<commit_message>
Many things are hizi-bizily done
</commit_message>
<xml_diff>
--- a/Structure_Files/PharmaSys_ERD.pptx
+++ b/Structure_Files/PharmaSys_ERD.pptx
@@ -207,7 +207,7 @@
           <a:p>
             <a:fld id="{332ADCBC-691D-4B13-8C74-A13299778862}" type="datetimeFigureOut">
               <a:rPr lang="en-US" smtClean="0"/>
-              <a:t>3/16/2014</a:t>
+              <a:t>3/31/2014</a:t>
             </a:fld>
             <a:endParaRPr lang="en-US"/>
           </a:p>
@@ -1279,7 +1279,7 @@
           <a:p>
             <a:fld id="{381A1DB9-AC5F-48C7-82CB-A8BF3B53D494}" type="datetime1">
               <a:rPr lang="en-US" smtClean="0"/>
-              <a:t>3/16/2014</a:t>
+              <a:t>3/31/2014</a:t>
             </a:fld>
             <a:endParaRPr lang="en-US"/>
           </a:p>
@@ -1445,7 +1445,7 @@
           <a:p>
             <a:fld id="{2A58270D-1D54-4B25-B231-451F1E1404F7}" type="datetime1">
               <a:rPr lang="en-US" smtClean="0"/>
-              <a:t>3/16/2014</a:t>
+              <a:t>3/31/2014</a:t>
             </a:fld>
             <a:endParaRPr lang="en-US"/>
           </a:p>
@@ -1621,7 +1621,7 @@
           <a:p>
             <a:fld id="{13DA4554-48D5-4857-9805-5DEB00CBBE5E}" type="datetime1">
               <a:rPr lang="en-US" smtClean="0"/>
-              <a:t>3/16/2014</a:t>
+              <a:t>3/31/2014</a:t>
             </a:fld>
             <a:endParaRPr lang="en-US"/>
           </a:p>
@@ -1787,7 +1787,7 @@
           <a:p>
             <a:fld id="{AD9C55BB-5225-47CA-B201-19A823A8A6A5}" type="datetime1">
               <a:rPr lang="en-US" smtClean="0"/>
-              <a:t>3/16/2014</a:t>
+              <a:t>3/31/2014</a:t>
             </a:fld>
             <a:endParaRPr lang="en-US"/>
           </a:p>
@@ -2029,7 +2029,7 @@
           <a:p>
             <a:fld id="{4056D2C3-EE8E-4956-B7D4-9D5D3AF16255}" type="datetime1">
               <a:rPr lang="en-US" smtClean="0"/>
-              <a:t>3/16/2014</a:t>
+              <a:t>3/31/2014</a:t>
             </a:fld>
             <a:endParaRPr lang="en-US"/>
           </a:p>
@@ -2313,7 +2313,7 @@
           <a:p>
             <a:fld id="{C8FC113D-3914-4B23-9E3F-C8D1B6FC965C}" type="datetime1">
               <a:rPr lang="en-US" smtClean="0"/>
-              <a:t>3/16/2014</a:t>
+              <a:t>3/31/2014</a:t>
             </a:fld>
             <a:endParaRPr lang="en-US"/>
           </a:p>
@@ -2731,7 +2731,7 @@
           <a:p>
             <a:fld id="{1273C6DE-9BDB-431B-AA33-F00D6808E59C}" type="datetime1">
               <a:rPr lang="en-US" smtClean="0"/>
-              <a:t>3/16/2014</a:t>
+              <a:t>3/31/2014</a:t>
             </a:fld>
             <a:endParaRPr lang="en-US"/>
           </a:p>
@@ -2845,7 +2845,7 @@
           <a:p>
             <a:fld id="{D5295EE0-AB99-48DC-9B6D-4A79A47C93F2}" type="datetime1">
               <a:rPr lang="en-US" smtClean="0"/>
-              <a:t>3/16/2014</a:t>
+              <a:t>3/31/2014</a:t>
             </a:fld>
             <a:endParaRPr lang="en-US"/>
           </a:p>
@@ -2936,7 +2936,7 @@
           <a:p>
             <a:fld id="{E149B381-418D-4593-A3D8-8E93FBD95C48}" type="datetime1">
               <a:rPr lang="en-US" smtClean="0"/>
-              <a:t>3/16/2014</a:t>
+              <a:t>3/31/2014</a:t>
             </a:fld>
             <a:endParaRPr lang="en-US"/>
           </a:p>
@@ -3209,7 +3209,7 @@
           <a:p>
             <a:fld id="{AFBBCD57-A005-4A08-921F-2E8371D09F9D}" type="datetime1">
               <a:rPr lang="en-US" smtClean="0"/>
-              <a:t>3/16/2014</a:t>
+              <a:t>3/31/2014</a:t>
             </a:fld>
             <a:endParaRPr lang="en-US"/>
           </a:p>
@@ -3458,7 +3458,7 @@
           <a:p>
             <a:fld id="{14452300-752E-466F-B70D-1D9E0F37529D}" type="datetime1">
               <a:rPr lang="en-US" smtClean="0"/>
-              <a:t>3/16/2014</a:t>
+              <a:t>3/31/2014</a:t>
             </a:fld>
             <a:endParaRPr lang="en-US"/>
           </a:p>
@@ -3667,7 +3667,7 @@
           <a:p>
             <a:fld id="{246B721E-84AA-4368-AF08-11362E11D7DE}" type="datetime1">
               <a:rPr lang="en-US" smtClean="0"/>
-              <a:t>3/16/2014</a:t>
+              <a:t>3/31/2014</a:t>
             </a:fld>
             <a:endParaRPr lang="en-US"/>
           </a:p>
@@ -14367,11 +14367,7 @@
             <a:pPr algn="ctr"/>
             <a:r>
               <a:rPr lang="en-US" dirty="0" smtClean="0"/>
-              <a:t>Number of </a:t>
-            </a:r>
-            <a:r>
-              <a:rPr lang="en-US" dirty="0" smtClean="0"/>
-              <a:t>MIO</a:t>
+              <a:t>Number of MIO</a:t>
             </a:r>
             <a:endParaRPr lang="en-US" dirty="0"/>
           </a:p>
@@ -15820,8 +15816,8 @@
         </p:nvCxnSpPr>
         <p:spPr>
           <a:xfrm>
-            <a:off x="8419531" y="4532860"/>
-            <a:ext cx="569" cy="111287"/>
+            <a:off x="8420100" y="4287551"/>
+            <a:ext cx="0" cy="356596"/>
           </a:xfrm>
           <a:prstGeom prst="line">
             <a:avLst/>
@@ -15850,8 +15846,8 @@
         </p:nvSpPr>
         <p:spPr>
           <a:xfrm>
-            <a:off x="7848031" y="4056610"/>
-            <a:ext cx="1143000" cy="476250"/>
+            <a:off x="7886700" y="3811301"/>
+            <a:ext cx="1066800" cy="476250"/>
           </a:xfrm>
           <a:prstGeom prst="flowChartDecision">
             <a:avLst/>
@@ -17307,8 +17303,8 @@
         </p:nvCxnSpPr>
         <p:spPr>
           <a:xfrm flipV="1">
-            <a:off x="8419531" y="3384176"/>
-            <a:ext cx="569" cy="672434"/>
+            <a:off x="8420100" y="3384176"/>
+            <a:ext cx="0" cy="427125"/>
           </a:xfrm>
           <a:prstGeom prst="straightConnector1">
             <a:avLst/>

</xml_diff>